<commit_message>
Modified placement of Prerequisite Product Info.
</commit_message>
<xml_diff>
--- a/License-Info-Exchange/Proposal/UsageProfile_On_SPDX_Structure.pptx
+++ b/License-Info-Exchange/Proposal/UsageProfile_On_SPDX_Structure.pptx
@@ -3734,13 +3734,13 @@
         </p:nvSpPr>
         <p:spPr>
           <a:xfrm>
-            <a:off x="8612480" y="2680816"/>
+            <a:off x="259309" y="3526972"/>
             <a:ext cx="1758462" cy="535912"/>
           </a:xfrm>
           <a:prstGeom prst="wedgeRectCallout">
             <a:avLst>
-              <a:gd name="adj1" fmla="val -63691"/>
-              <a:gd name="adj2" fmla="val -182"/>
+              <a:gd name="adj1" fmla="val 31395"/>
+              <a:gd name="adj2" fmla="val -89557"/>
             </a:avLst>
           </a:prstGeom>
         </p:spPr>
@@ -3797,13 +3797,13 @@
         </p:nvSpPr>
         <p:spPr>
           <a:xfrm>
-            <a:off x="9052095" y="4257570"/>
+            <a:off x="10223598" y="5213253"/>
             <a:ext cx="1758462" cy="885930"/>
           </a:xfrm>
           <a:prstGeom prst="wedgeRectCallout">
             <a:avLst>
-              <a:gd name="adj1" fmla="val -87690"/>
-              <a:gd name="adj2" fmla="val -31154"/>
+              <a:gd name="adj1" fmla="val 462"/>
+              <a:gd name="adj2" fmla="val -70473"/>
             </a:avLst>
           </a:prstGeom>
         </p:spPr>
@@ -3835,6 +3835,451 @@
               <a:t>” (proposed “License Compatibility” before) might be placed as this level</a:t>
             </a:r>
             <a:endParaRPr kumimoji="1" lang="ja-JP" altLang="en-US" sz="900" dirty="0"/>
+          </a:p>
+        </p:txBody>
+      </p:sp>
+      <p:grpSp>
+        <p:nvGrpSpPr>
+          <p:cNvPr id="10" name="グループ化 9">
+            <a:extLst>
+              <a:ext uri="{FF2B5EF4-FFF2-40B4-BE49-F238E27FC236}">
+                <a16:creationId xmlns:a16="http://schemas.microsoft.com/office/drawing/2014/main" id="{C53F33AD-DE51-4782-AFE5-CCA1E7662083}"/>
+              </a:ext>
+            </a:extLst>
+          </p:cNvPr>
+          <p:cNvGrpSpPr/>
+          <p:nvPr/>
+        </p:nvGrpSpPr>
+        <p:grpSpPr>
+          <a:xfrm>
+            <a:off x="196741" y="2329542"/>
+            <a:ext cx="2063932" cy="1001486"/>
+            <a:chOff x="349476" y="1262743"/>
+            <a:chExt cx="2063932" cy="1001486"/>
+          </a:xfrm>
+        </p:grpSpPr>
+        <p:sp>
+          <p:nvSpPr>
+            <p:cNvPr id="2" name="正方形/長方形 1">
+              <a:extLst>
+                <a:ext uri="{FF2B5EF4-FFF2-40B4-BE49-F238E27FC236}">
+                  <a16:creationId xmlns:a16="http://schemas.microsoft.com/office/drawing/2014/main" id="{A3992E7A-420A-4FAE-A748-AE2F0BD688AF}"/>
+                </a:ext>
+              </a:extLst>
+            </p:cNvPr>
+            <p:cNvSpPr/>
+            <p:nvPr/>
+          </p:nvSpPr>
+          <p:spPr>
+            <a:xfrm>
+              <a:off x="349476" y="1262743"/>
+              <a:ext cx="2063932" cy="1001486"/>
+            </a:xfrm>
+            <a:prstGeom prst="rect">
+              <a:avLst/>
+            </a:prstGeom>
+            <a:solidFill>
+              <a:schemeClr val="bg1"/>
+            </a:solidFill>
+          </p:spPr>
+          <p:style>
+            <a:lnRef idx="2">
+              <a:schemeClr val="accent1">
+                <a:shade val="50000"/>
+              </a:schemeClr>
+            </a:lnRef>
+            <a:fillRef idx="1">
+              <a:schemeClr val="accent1"/>
+            </a:fillRef>
+            <a:effectRef idx="0">
+              <a:schemeClr val="accent1"/>
+            </a:effectRef>
+            <a:fontRef idx="minor">
+              <a:schemeClr val="lt1"/>
+            </a:fontRef>
+          </p:style>
+          <p:txBody>
+            <a:bodyPr rtlCol="0" anchor="ctr"/>
+            <a:lstStyle/>
+            <a:p>
+              <a:pPr algn="ctr"/>
+              <a:endParaRPr kumimoji="1" lang="ja-JP" altLang="en-US"/>
+            </a:p>
+          </p:txBody>
+        </p:sp>
+        <p:sp>
+          <p:nvSpPr>
+            <p:cNvPr id="3" name="テキスト ボックス 2">
+              <a:extLst>
+                <a:ext uri="{FF2B5EF4-FFF2-40B4-BE49-F238E27FC236}">
+                  <a16:creationId xmlns:a16="http://schemas.microsoft.com/office/drawing/2014/main" id="{BE5899AB-077E-45AE-8AEE-A073830E98F5}"/>
+                </a:ext>
+              </a:extLst>
+            </p:cNvPr>
+            <p:cNvSpPr txBox="1"/>
+            <p:nvPr/>
+          </p:nvSpPr>
+          <p:spPr>
+            <a:xfrm>
+              <a:off x="732673" y="1262743"/>
+              <a:ext cx="1260281" cy="246221"/>
+            </a:xfrm>
+            <a:prstGeom prst="rect">
+              <a:avLst/>
+            </a:prstGeom>
+            <a:noFill/>
+          </p:spPr>
+          <p:txBody>
+            <a:bodyPr wrap="none" rtlCol="0">
+              <a:spAutoFit/>
+            </a:bodyPr>
+            <a:lstStyle/>
+            <a:p>
+              <a:r>
+                <a:rPr kumimoji="1" lang="en-US" altLang="ja-JP" sz="1000" dirty="0" err="1"/>
+                <a:t>TargetProductInfo</a:t>
+              </a:r>
+              <a:endParaRPr kumimoji="1" lang="ja-JP" altLang="en-US" sz="1000" dirty="0"/>
+            </a:p>
+          </p:txBody>
+        </p:sp>
+        <p:cxnSp>
+          <p:nvCxnSpPr>
+            <p:cNvPr id="9" name="直線コネクタ 8">
+              <a:extLst>
+                <a:ext uri="{FF2B5EF4-FFF2-40B4-BE49-F238E27FC236}">
+                  <a16:creationId xmlns:a16="http://schemas.microsoft.com/office/drawing/2014/main" id="{B19C9286-C0E0-4F10-850A-01974ABA438C}"/>
+                </a:ext>
+              </a:extLst>
+            </p:cNvPr>
+            <p:cNvCxnSpPr/>
+            <p:nvPr/>
+          </p:nvCxnSpPr>
+          <p:spPr>
+            <a:xfrm>
+              <a:off x="349476" y="1576251"/>
+              <a:ext cx="2063932" cy="0"/>
+            </a:xfrm>
+            <a:prstGeom prst="line">
+              <a:avLst/>
+            </a:prstGeom>
+          </p:spPr>
+          <p:style>
+            <a:lnRef idx="1">
+              <a:schemeClr val="dk1"/>
+            </a:lnRef>
+            <a:fillRef idx="0">
+              <a:schemeClr val="dk1"/>
+            </a:fillRef>
+            <a:effectRef idx="0">
+              <a:schemeClr val="dk1"/>
+            </a:effectRef>
+            <a:fontRef idx="minor">
+              <a:schemeClr val="tx1"/>
+            </a:fontRef>
+          </p:style>
+        </p:cxnSp>
+      </p:grpSp>
+      <p:cxnSp>
+        <p:nvCxnSpPr>
+          <p:cNvPr id="14" name="コネクタ: カギ線 13">
+            <a:extLst>
+              <a:ext uri="{FF2B5EF4-FFF2-40B4-BE49-F238E27FC236}">
+                <a16:creationId xmlns:a16="http://schemas.microsoft.com/office/drawing/2014/main" id="{0E85CE37-8D14-4FA1-9621-0F3287B7E8A5}"/>
+              </a:ext>
+            </a:extLst>
+          </p:cNvPr>
+          <p:cNvCxnSpPr>
+            <a:cxnSpLocks/>
+            <a:endCxn id="3" idx="0"/>
+          </p:cNvCxnSpPr>
+          <p:nvPr/>
+        </p:nvCxnSpPr>
+        <p:spPr>
+          <a:xfrm rot="10800000" flipV="1">
+            <a:off x="1210079" y="1955072"/>
+            <a:ext cx="1293496" cy="374469"/>
+          </a:xfrm>
+          <a:prstGeom prst="bentConnector2">
+            <a:avLst/>
+          </a:prstGeom>
+          <a:ln>
+            <a:solidFill>
+              <a:schemeClr val="tx1"/>
+            </a:solidFill>
+            <a:headEnd type="none" w="med" len="med"/>
+            <a:tailEnd type="arrow" w="med" len="med"/>
+          </a:ln>
+        </p:spPr>
+        <p:style>
+          <a:lnRef idx="1">
+            <a:schemeClr val="accent1"/>
+          </a:lnRef>
+          <a:fillRef idx="0">
+            <a:schemeClr val="accent1"/>
+          </a:fillRef>
+          <a:effectRef idx="0">
+            <a:schemeClr val="accent1"/>
+          </a:effectRef>
+          <a:fontRef idx="minor">
+            <a:schemeClr val="tx1"/>
+          </a:fontRef>
+        </p:style>
+      </p:cxnSp>
+      <p:sp>
+        <p:nvSpPr>
+          <p:cNvPr id="16" name="テキスト ボックス 15">
+            <a:extLst>
+              <a:ext uri="{FF2B5EF4-FFF2-40B4-BE49-F238E27FC236}">
+                <a16:creationId xmlns:a16="http://schemas.microsoft.com/office/drawing/2014/main" id="{547F2150-7A50-4067-B2DD-5AD255469E22}"/>
+              </a:ext>
+            </a:extLst>
+          </p:cNvPr>
+          <p:cNvSpPr txBox="1"/>
+          <p:nvPr/>
+        </p:nvSpPr>
+        <p:spPr>
+          <a:xfrm>
+            <a:off x="1903179" y="1759128"/>
+            <a:ext cx="359394" cy="253916"/>
+          </a:xfrm>
+          <a:prstGeom prst="rect">
+            <a:avLst/>
+          </a:prstGeom>
+          <a:noFill/>
+        </p:spPr>
+        <p:txBody>
+          <a:bodyPr wrap="none" rtlCol="0">
+            <a:spAutoFit/>
+          </a:bodyPr>
+          <a:lstStyle/>
+          <a:p>
+            <a:r>
+              <a:rPr kumimoji="1" lang="en-US" altLang="ja-JP" sz="1050" dirty="0"/>
+              <a:t>0.*</a:t>
+            </a:r>
+            <a:endParaRPr kumimoji="1" lang="ja-JP" altLang="en-US" sz="1050" dirty="0"/>
+          </a:p>
+        </p:txBody>
+      </p:sp>
+      <p:grpSp>
+        <p:nvGrpSpPr>
+          <p:cNvPr id="17" name="グループ化 16">
+            <a:extLst>
+              <a:ext uri="{FF2B5EF4-FFF2-40B4-BE49-F238E27FC236}">
+                <a16:creationId xmlns:a16="http://schemas.microsoft.com/office/drawing/2014/main" id="{2862478D-801A-4327-9D53-B34ADEC11CBE}"/>
+              </a:ext>
+            </a:extLst>
+          </p:cNvPr>
+          <p:cNvGrpSpPr/>
+          <p:nvPr/>
+        </p:nvGrpSpPr>
+        <p:grpSpPr>
+          <a:xfrm>
+            <a:off x="9918128" y="4064038"/>
+            <a:ext cx="2063932" cy="1001486"/>
+            <a:chOff x="349476" y="1262743"/>
+            <a:chExt cx="2063932" cy="1001486"/>
+          </a:xfrm>
+        </p:grpSpPr>
+        <p:sp>
+          <p:nvSpPr>
+            <p:cNvPr id="18" name="正方形/長方形 17">
+              <a:extLst>
+                <a:ext uri="{FF2B5EF4-FFF2-40B4-BE49-F238E27FC236}">
+                  <a16:creationId xmlns:a16="http://schemas.microsoft.com/office/drawing/2014/main" id="{56B88EA1-EF30-42DD-A309-6BFD1F65AC1D}"/>
+                </a:ext>
+              </a:extLst>
+            </p:cNvPr>
+            <p:cNvSpPr/>
+            <p:nvPr/>
+          </p:nvSpPr>
+          <p:spPr>
+            <a:xfrm>
+              <a:off x="349476" y="1262743"/>
+              <a:ext cx="2063932" cy="1001486"/>
+            </a:xfrm>
+            <a:prstGeom prst="rect">
+              <a:avLst/>
+            </a:prstGeom>
+            <a:solidFill>
+              <a:schemeClr val="bg1"/>
+            </a:solidFill>
+          </p:spPr>
+          <p:style>
+            <a:lnRef idx="2">
+              <a:schemeClr val="accent1">
+                <a:shade val="50000"/>
+              </a:schemeClr>
+            </a:lnRef>
+            <a:fillRef idx="1">
+              <a:schemeClr val="accent1"/>
+            </a:fillRef>
+            <a:effectRef idx="0">
+              <a:schemeClr val="accent1"/>
+            </a:effectRef>
+            <a:fontRef idx="minor">
+              <a:schemeClr val="lt1"/>
+            </a:fontRef>
+          </p:style>
+          <p:txBody>
+            <a:bodyPr rtlCol="0" anchor="ctr"/>
+            <a:lstStyle/>
+            <a:p>
+              <a:pPr algn="ctr"/>
+              <a:endParaRPr kumimoji="1" lang="ja-JP" altLang="en-US"/>
+            </a:p>
+          </p:txBody>
+        </p:sp>
+        <p:sp>
+          <p:nvSpPr>
+            <p:cNvPr id="19" name="テキスト ボックス 18">
+              <a:extLst>
+                <a:ext uri="{FF2B5EF4-FFF2-40B4-BE49-F238E27FC236}">
+                  <a16:creationId xmlns:a16="http://schemas.microsoft.com/office/drawing/2014/main" id="{C463D9EF-61BF-45C7-B3EF-1E98C0DA7375}"/>
+                </a:ext>
+              </a:extLst>
+            </p:cNvPr>
+            <p:cNvSpPr txBox="1"/>
+            <p:nvPr/>
+          </p:nvSpPr>
+          <p:spPr>
+            <a:xfrm>
+              <a:off x="541075" y="1295924"/>
+              <a:ext cx="1744388" cy="246221"/>
+            </a:xfrm>
+            <a:prstGeom prst="rect">
+              <a:avLst/>
+            </a:prstGeom>
+            <a:noFill/>
+          </p:spPr>
+          <p:txBody>
+            <a:bodyPr wrap="none" rtlCol="0">
+              <a:spAutoFit/>
+            </a:bodyPr>
+            <a:lstStyle/>
+            <a:p>
+              <a:r>
+                <a:rPr kumimoji="1" lang="en-US" altLang="ja-JP" sz="1000" dirty="0"/>
+                <a:t>Usage Information (T.B.D)</a:t>
+              </a:r>
+              <a:endParaRPr kumimoji="1" lang="ja-JP" altLang="en-US" sz="1000" dirty="0"/>
+            </a:p>
+          </p:txBody>
+        </p:sp>
+        <p:cxnSp>
+          <p:nvCxnSpPr>
+            <p:cNvPr id="20" name="直線コネクタ 19">
+              <a:extLst>
+                <a:ext uri="{FF2B5EF4-FFF2-40B4-BE49-F238E27FC236}">
+                  <a16:creationId xmlns:a16="http://schemas.microsoft.com/office/drawing/2014/main" id="{6B73E9D1-B352-42C2-ADFD-CB582F29AE55}"/>
+                </a:ext>
+              </a:extLst>
+            </p:cNvPr>
+            <p:cNvCxnSpPr/>
+            <p:nvPr/>
+          </p:nvCxnSpPr>
+          <p:spPr>
+            <a:xfrm>
+              <a:off x="349476" y="1576251"/>
+              <a:ext cx="2063932" cy="0"/>
+            </a:xfrm>
+            <a:prstGeom prst="line">
+              <a:avLst/>
+            </a:prstGeom>
+          </p:spPr>
+          <p:style>
+            <a:lnRef idx="1">
+              <a:schemeClr val="dk1"/>
+            </a:lnRef>
+            <a:fillRef idx="0">
+              <a:schemeClr val="dk1"/>
+            </a:fillRef>
+            <a:effectRef idx="0">
+              <a:schemeClr val="dk1"/>
+            </a:effectRef>
+            <a:fontRef idx="minor">
+              <a:schemeClr val="tx1"/>
+            </a:fontRef>
+          </p:style>
+        </p:cxnSp>
+      </p:grpSp>
+      <p:cxnSp>
+        <p:nvCxnSpPr>
+          <p:cNvPr id="22" name="コネクタ: カギ線 21">
+            <a:extLst>
+              <a:ext uri="{FF2B5EF4-FFF2-40B4-BE49-F238E27FC236}">
+                <a16:creationId xmlns:a16="http://schemas.microsoft.com/office/drawing/2014/main" id="{764B90CC-A1DB-45BA-81F8-6BA40E98DFFA}"/>
+              </a:ext>
+            </a:extLst>
+          </p:cNvPr>
+          <p:cNvCxnSpPr>
+            <a:cxnSpLocks/>
+            <a:endCxn id="19" idx="0"/>
+          </p:cNvCxnSpPr>
+          <p:nvPr/>
+        </p:nvCxnSpPr>
+        <p:spPr>
+          <a:xfrm>
+            <a:off x="6792676" y="2751260"/>
+            <a:ext cx="4189245" cy="1345959"/>
+          </a:xfrm>
+          <a:prstGeom prst="bentConnector2">
+            <a:avLst/>
+          </a:prstGeom>
+          <a:ln w="38100">
+            <a:headEnd type="none" w="med" len="med"/>
+            <a:tailEnd type="arrow" w="med" len="med"/>
+          </a:ln>
+        </p:spPr>
+        <p:style>
+          <a:lnRef idx="1">
+            <a:schemeClr val="dk1"/>
+          </a:lnRef>
+          <a:fillRef idx="0">
+            <a:schemeClr val="dk1"/>
+          </a:fillRef>
+          <a:effectRef idx="0">
+            <a:schemeClr val="dk1"/>
+          </a:effectRef>
+          <a:fontRef idx="minor">
+            <a:schemeClr val="tx1"/>
+          </a:fontRef>
+        </p:style>
+      </p:cxnSp>
+      <p:sp>
+        <p:nvSpPr>
+          <p:cNvPr id="30" name="テキスト ボックス 29">
+            <a:extLst>
+              <a:ext uri="{FF2B5EF4-FFF2-40B4-BE49-F238E27FC236}">
+                <a16:creationId xmlns:a16="http://schemas.microsoft.com/office/drawing/2014/main" id="{2EB0963E-6FC4-47D3-8679-1B3795DE2CE6}"/>
+              </a:ext>
+            </a:extLst>
+          </p:cNvPr>
+          <p:cNvSpPr txBox="1"/>
+          <p:nvPr/>
+        </p:nvSpPr>
+        <p:spPr>
+          <a:xfrm>
+            <a:off x="10622527" y="2461360"/>
+            <a:ext cx="359394" cy="253916"/>
+          </a:xfrm>
+          <a:prstGeom prst="rect">
+            <a:avLst/>
+          </a:prstGeom>
+          <a:noFill/>
+        </p:spPr>
+        <p:txBody>
+          <a:bodyPr wrap="none" rtlCol="0">
+            <a:spAutoFit/>
+          </a:bodyPr>
+          <a:lstStyle/>
+          <a:p>
+            <a:r>
+              <a:rPr kumimoji="1" lang="en-US" altLang="ja-JP" sz="1050" dirty="0"/>
+              <a:t>0.*</a:t>
+            </a:r>
+            <a:endParaRPr kumimoji="1" lang="ja-JP" altLang="en-US" sz="1050" dirty="0"/>
           </a:p>
         </p:txBody>
       </p:sp>

</xml_diff>

<commit_message>
Enhance description in each box
</commit_message>
<xml_diff>
--- a/License-Info-Exchange/Proposal/UsageProfile_On_SPDX_Structure.pptx
+++ b/License-Info-Exchange/Proposal/UsageProfile_On_SPDX_Structure.pptx
@@ -3675,13 +3675,13 @@
         </p:nvSpPr>
         <p:spPr>
           <a:xfrm>
-            <a:off x="4461468" y="2411604"/>
-            <a:ext cx="1758462" cy="306475"/>
+            <a:off x="4461468" y="2411603"/>
+            <a:ext cx="1758462" cy="1965937"/>
           </a:xfrm>
           <a:prstGeom prst="wedgeRectCallout">
             <a:avLst>
-              <a:gd name="adj1" fmla="val -67976"/>
-              <a:gd name="adj2" fmla="val -3933"/>
+              <a:gd name="adj1" fmla="val -69249"/>
+              <a:gd name="adj2" fmla="val -42509"/>
             </a:avLst>
           </a:prstGeom>
         </p:spPr>
@@ -3703,7 +3703,6 @@
           <a:bodyPr rtlCol="0" anchor="ctr"/>
           <a:lstStyle/>
           <a:p>
-            <a:pPr algn="ctr"/>
             <a:r>
               <a:rPr lang="en-US" altLang="ja-JP" sz="900" dirty="0"/>
               <a:t>“</a:t>
@@ -3714,125 +3713,22 @@
             </a:r>
             <a:r>
               <a:rPr kumimoji="1" lang="en-US" altLang="ja-JP" sz="900" dirty="0"/>
-              <a:t>” might be placed to this level</a:t>
-            </a:r>
-            <a:endParaRPr kumimoji="1" lang="ja-JP" altLang="en-US" sz="900" dirty="0"/>
-          </a:p>
-        </p:txBody>
-      </p:sp>
-      <p:sp>
-        <p:nvSpPr>
-          <p:cNvPr id="7" name="吹き出し: 四角形 6">
-            <a:extLst>
-              <a:ext uri="{FF2B5EF4-FFF2-40B4-BE49-F238E27FC236}">
-                <a16:creationId xmlns:a16="http://schemas.microsoft.com/office/drawing/2014/main" id="{EEF25765-442E-44C6-8D43-A1C9B7E6C208}"/>
-              </a:ext>
-            </a:extLst>
-          </p:cNvPr>
-          <p:cNvSpPr/>
-          <p:nvPr/>
-        </p:nvSpPr>
-        <p:spPr>
-          <a:xfrm>
-            <a:off x="259309" y="3526972"/>
-            <a:ext cx="1758462" cy="535912"/>
-          </a:xfrm>
-          <a:prstGeom prst="wedgeRectCallout">
-            <a:avLst>
-              <a:gd name="adj1" fmla="val 31395"/>
-              <a:gd name="adj2" fmla="val -89557"/>
-            </a:avLst>
-          </a:prstGeom>
-        </p:spPr>
-        <p:style>
-          <a:lnRef idx="2">
-            <a:schemeClr val="accent1"/>
-          </a:lnRef>
-          <a:fillRef idx="1">
-            <a:schemeClr val="lt1"/>
-          </a:fillRef>
-          <a:effectRef idx="0">
-            <a:schemeClr val="accent1"/>
-          </a:effectRef>
-          <a:fontRef idx="minor">
-            <a:schemeClr val="dk1"/>
-          </a:fontRef>
-        </p:style>
-        <p:txBody>
-          <a:bodyPr rtlCol="0" anchor="ctr"/>
-          <a:lstStyle/>
-          <a:p>
-            <a:pPr algn="ctr"/>
+              <a:t>” (for SPDX description such as “Usage Info.”) might be placed to this level.</a:t>
+            </a:r>
+          </a:p>
+          <a:p>
+            <a:endParaRPr lang="en-US" altLang="ja-JP" sz="900" dirty="0"/>
+          </a:p>
+          <a:p>
+            <a:r>
+              <a:rPr kumimoji="1" lang="en-US" altLang="ja-JP" sz="900" dirty="0"/>
+              <a:t>It’s an Expiration Date and/or “Supplier’s recommendation of the review deadline for SPDX description such as Product Launch”. </a:t>
+            </a:r>
+          </a:p>
+          <a:p>
             <a:r>
               <a:rPr lang="en-US" altLang="ja-JP" sz="900" dirty="0"/>
-              <a:t>“</a:t>
-            </a:r>
-            <a:r>
-              <a:rPr lang="en-US" altLang="ja-JP" sz="900" dirty="0" err="1"/>
-              <a:t>Target</a:t>
-            </a:r>
-            <a:r>
-              <a:rPr kumimoji="1" lang="en-US" altLang="ja-JP" sz="900" dirty="0" err="1"/>
-              <a:t>ProductInfo</a:t>
-            </a:r>
-            <a:r>
-              <a:rPr kumimoji="1" lang="en-US" altLang="ja-JP" sz="900" dirty="0"/>
-              <a:t>” (proposed “Prerequisite Produce Name” before) might be placed as this level</a:t>
-            </a:r>
-            <a:endParaRPr kumimoji="1" lang="ja-JP" altLang="en-US" sz="900" dirty="0"/>
-          </a:p>
-        </p:txBody>
-      </p:sp>
-      <p:sp>
-        <p:nvSpPr>
-          <p:cNvPr id="8" name="吹き出し: 四角形 7">
-            <a:extLst>
-              <a:ext uri="{FF2B5EF4-FFF2-40B4-BE49-F238E27FC236}">
-                <a16:creationId xmlns:a16="http://schemas.microsoft.com/office/drawing/2014/main" id="{7B941F36-E5AA-4617-88EA-A1D9DF5E2FC8}"/>
-              </a:ext>
-            </a:extLst>
-          </p:cNvPr>
-          <p:cNvSpPr/>
-          <p:nvPr/>
-        </p:nvSpPr>
-        <p:spPr>
-          <a:xfrm>
-            <a:off x="10223598" y="5213253"/>
-            <a:ext cx="1758462" cy="885930"/>
-          </a:xfrm>
-          <a:prstGeom prst="wedgeRectCallout">
-            <a:avLst>
-              <a:gd name="adj1" fmla="val 462"/>
-              <a:gd name="adj2" fmla="val -70473"/>
-            </a:avLst>
-          </a:prstGeom>
-        </p:spPr>
-        <p:style>
-          <a:lnRef idx="2">
-            <a:schemeClr val="accent1"/>
-          </a:lnRef>
-          <a:fillRef idx="1">
-            <a:schemeClr val="lt1"/>
-          </a:fillRef>
-          <a:effectRef idx="0">
-            <a:schemeClr val="accent1"/>
-          </a:effectRef>
-          <a:fontRef idx="minor">
-            <a:schemeClr val="dk1"/>
-          </a:fontRef>
-        </p:style>
-        <p:txBody>
-          <a:bodyPr rtlCol="0" anchor="ctr"/>
-          <a:lstStyle/>
-          <a:p>
-            <a:pPr algn="ctr"/>
-            <a:r>
-              <a:rPr lang="en-US" altLang="ja-JP" sz="900" dirty="0"/>
-              <a:t>Usage information such as “not fit with final product, but for verification (T.B.D)</a:t>
-            </a:r>
-            <a:r>
-              <a:rPr kumimoji="1" lang="en-US" altLang="ja-JP" sz="900" dirty="0"/>
-              <a:t>” (proposed “License Compatibility” before) might be placed as this level</a:t>
+              <a:t>“The Expiration Information for each Package” required another discussion.</a:t>
             </a:r>
             <a:endParaRPr kumimoji="1" lang="ja-JP" altLang="en-US" sz="900" dirty="0"/>
           </a:p>
@@ -4280,6 +4176,196 @@
               <a:t>0.*</a:t>
             </a:r>
             <a:endParaRPr kumimoji="1" lang="ja-JP" altLang="en-US" sz="1050" dirty="0"/>
+          </a:p>
+        </p:txBody>
+      </p:sp>
+      <p:sp>
+        <p:nvSpPr>
+          <p:cNvPr id="32" name="正方形/長方形 31">
+            <a:extLst>
+              <a:ext uri="{FF2B5EF4-FFF2-40B4-BE49-F238E27FC236}">
+                <a16:creationId xmlns:a16="http://schemas.microsoft.com/office/drawing/2014/main" id="{16FD8F87-1910-43C7-A1F5-4ED7032524D2}"/>
+              </a:ext>
+            </a:extLst>
+          </p:cNvPr>
+          <p:cNvSpPr/>
+          <p:nvPr/>
+        </p:nvSpPr>
+        <p:spPr>
+          <a:xfrm>
+            <a:off x="6572072" y="2452652"/>
+            <a:ext cx="3515723" cy="262624"/>
+          </a:xfrm>
+          <a:prstGeom prst="rect">
+            <a:avLst/>
+          </a:prstGeom>
+        </p:spPr>
+        <p:style>
+          <a:lnRef idx="2">
+            <a:schemeClr val="dk1"/>
+          </a:lnRef>
+          <a:fillRef idx="1">
+            <a:schemeClr val="lt1"/>
+          </a:fillRef>
+          <a:effectRef idx="0">
+            <a:schemeClr val="dk1"/>
+          </a:effectRef>
+          <a:fontRef idx="minor">
+            <a:schemeClr val="dk1"/>
+          </a:fontRef>
+        </p:style>
+        <p:txBody>
+          <a:bodyPr rtlCol="0" anchor="ctr"/>
+          <a:lstStyle/>
+          <a:p>
+            <a:pPr algn="ctr"/>
+            <a:r>
+              <a:rPr kumimoji="1" lang="en-US" altLang="ja-JP" sz="900" dirty="0"/>
+              <a:t>&lt;&lt;Property&gt;&gt; -</a:t>
+            </a:r>
+            <a:r>
+              <a:rPr kumimoji="1" lang="en-US" altLang="ja-JP" sz="900" dirty="0" err="1"/>
+              <a:t>UsageInfo</a:t>
+            </a:r>
+            <a:r>
+              <a:rPr kumimoji="1" lang="en-US" altLang="ja-JP" sz="900" dirty="0"/>
+              <a:t> or T.B.D: </a:t>
+            </a:r>
+            <a:r>
+              <a:rPr kumimoji="1" lang="en-US" altLang="ja-JP" sz="900" dirty="0" err="1"/>
+              <a:t>ExternalRef</a:t>
+            </a:r>
+            <a:r>
+              <a:rPr kumimoji="1" lang="en-US" altLang="ja-JP" sz="900" dirty="0"/>
+              <a:t> or String?</a:t>
+            </a:r>
+            <a:endParaRPr kumimoji="1" lang="ja-JP" altLang="en-US" sz="900" dirty="0"/>
+          </a:p>
+        </p:txBody>
+      </p:sp>
+      <p:sp>
+        <p:nvSpPr>
+          <p:cNvPr id="7" name="吹き出し: 四角形 6">
+            <a:extLst>
+              <a:ext uri="{FF2B5EF4-FFF2-40B4-BE49-F238E27FC236}">
+                <a16:creationId xmlns:a16="http://schemas.microsoft.com/office/drawing/2014/main" id="{EEF25765-442E-44C6-8D43-A1C9B7E6C208}"/>
+              </a:ext>
+            </a:extLst>
+          </p:cNvPr>
+          <p:cNvSpPr/>
+          <p:nvPr/>
+        </p:nvSpPr>
+        <p:spPr>
+          <a:xfrm>
+            <a:off x="291984" y="3234412"/>
+            <a:ext cx="1758462" cy="1539125"/>
+          </a:xfrm>
+          <a:prstGeom prst="wedgeRectCallout">
+            <a:avLst>
+              <a:gd name="adj1" fmla="val 12930"/>
+              <a:gd name="adj2" fmla="val -75492"/>
+            </a:avLst>
+          </a:prstGeom>
+        </p:spPr>
+        <p:style>
+          <a:lnRef idx="2">
+            <a:schemeClr val="accent1"/>
+          </a:lnRef>
+          <a:fillRef idx="1">
+            <a:schemeClr val="lt1"/>
+          </a:fillRef>
+          <a:effectRef idx="0">
+            <a:schemeClr val="accent1"/>
+          </a:effectRef>
+          <a:fontRef idx="minor">
+            <a:schemeClr val="dk1"/>
+          </a:fontRef>
+        </p:style>
+        <p:txBody>
+          <a:bodyPr rtlCol="0" anchor="ctr"/>
+          <a:lstStyle/>
+          <a:p>
+            <a:r>
+              <a:rPr lang="en-US" altLang="ja-JP" sz="900" dirty="0"/>
+              <a:t>“</a:t>
+            </a:r>
+            <a:r>
+              <a:rPr lang="en-US" altLang="ja-JP" sz="900" dirty="0" err="1"/>
+              <a:t>Target</a:t>
+            </a:r>
+            <a:r>
+              <a:rPr kumimoji="1" lang="en-US" altLang="ja-JP" sz="900" dirty="0" err="1"/>
+              <a:t>ProductInfo</a:t>
+            </a:r>
+            <a:r>
+              <a:rPr kumimoji="1" lang="en-US" altLang="ja-JP" sz="900" dirty="0"/>
+              <a:t>” might be placed as this level.</a:t>
+            </a:r>
+          </a:p>
+          <a:p>
+            <a:endParaRPr lang="en-US" altLang="ja-JP" sz="900" dirty="0"/>
+          </a:p>
+          <a:p>
+            <a:r>
+              <a:rPr kumimoji="1" lang="en-US" altLang="ja-JP" sz="900" dirty="0"/>
+              <a:t>Proposed as “Prerequisite Produce Name” before. Supplier may use this tag to suggest prerequisite target software environment when they write down “Usage Info.” into SPDX file.</a:t>
+            </a:r>
+            <a:endParaRPr kumimoji="1" lang="ja-JP" altLang="en-US" sz="900" dirty="0"/>
+          </a:p>
+        </p:txBody>
+      </p:sp>
+      <p:sp>
+        <p:nvSpPr>
+          <p:cNvPr id="8" name="吹き出し: 四角形 7">
+            <a:extLst>
+              <a:ext uri="{FF2B5EF4-FFF2-40B4-BE49-F238E27FC236}">
+                <a16:creationId xmlns:a16="http://schemas.microsoft.com/office/drawing/2014/main" id="{7B941F36-E5AA-4617-88EA-A1D9DF5E2FC8}"/>
+              </a:ext>
+            </a:extLst>
+          </p:cNvPr>
+          <p:cNvSpPr/>
+          <p:nvPr/>
+        </p:nvSpPr>
+        <p:spPr>
+          <a:xfrm>
+            <a:off x="10109727" y="4902886"/>
+            <a:ext cx="1758462" cy="885930"/>
+          </a:xfrm>
+          <a:prstGeom prst="wedgeRectCallout">
+            <a:avLst>
+              <a:gd name="adj1" fmla="val 462"/>
+              <a:gd name="adj2" fmla="val -70473"/>
+            </a:avLst>
+          </a:prstGeom>
+        </p:spPr>
+        <p:style>
+          <a:lnRef idx="2">
+            <a:schemeClr val="accent1"/>
+          </a:lnRef>
+          <a:fillRef idx="1">
+            <a:schemeClr val="lt1"/>
+          </a:fillRef>
+          <a:effectRef idx="0">
+            <a:schemeClr val="accent1"/>
+          </a:effectRef>
+          <a:fontRef idx="minor">
+            <a:schemeClr val="dk1"/>
+          </a:fontRef>
+        </p:style>
+        <p:txBody>
+          <a:bodyPr rtlCol="0" anchor="ctr"/>
+          <a:lstStyle/>
+          <a:p>
+            <a:pPr algn="ctr"/>
+            <a:r>
+              <a:rPr lang="en-US" altLang="ja-JP" sz="900" dirty="0"/>
+              <a:t>Usage information such as “not fit with final product, but for verification (T.B.D)</a:t>
+            </a:r>
+            <a:r>
+              <a:rPr kumimoji="1" lang="en-US" altLang="ja-JP" sz="900" dirty="0"/>
+              <a:t>” (proposed “License Compatibility” before) might be placed as this level</a:t>
+            </a:r>
+            <a:endParaRPr kumimoji="1" lang="ja-JP" altLang="en-US" sz="900" dirty="0"/>
           </a:p>
         </p:txBody>
       </p:sp>

</xml_diff>